<commit_message>
Take Home Ex 4
</commit_message>
<xml_diff>
--- a/_site/DataViz_Makeover/DataViz_Makeover1/Steps.pptx
+++ b/_site/DataViz_Makeover/DataViz_Makeover1/Steps.pptx
@@ -270,7 +270,7 @@
           <a:p>
             <a:fld id="{EB064AC1-ABF6-46DA-A589-1EFE59F3B602}" type="datetimeFigureOut">
               <a:rPr lang="en-SG" smtClean="0"/>
-              <a:t>12/2/2022</a:t>
+              <a:t>13/2/2022</a:t>
             </a:fld>
             <a:endParaRPr lang="en-SG"/>
           </a:p>
@@ -470,7 +470,7 @@
           <a:p>
             <a:fld id="{EB064AC1-ABF6-46DA-A589-1EFE59F3B602}" type="datetimeFigureOut">
               <a:rPr lang="en-SG" smtClean="0"/>
-              <a:t>12/2/2022</a:t>
+              <a:t>13/2/2022</a:t>
             </a:fld>
             <a:endParaRPr lang="en-SG"/>
           </a:p>
@@ -680,7 +680,7 @@
           <a:p>
             <a:fld id="{EB064AC1-ABF6-46DA-A589-1EFE59F3B602}" type="datetimeFigureOut">
               <a:rPr lang="en-SG" smtClean="0"/>
-              <a:t>12/2/2022</a:t>
+              <a:t>13/2/2022</a:t>
             </a:fld>
             <a:endParaRPr lang="en-SG"/>
           </a:p>
@@ -880,7 +880,7 @@
           <a:p>
             <a:fld id="{EB064AC1-ABF6-46DA-A589-1EFE59F3B602}" type="datetimeFigureOut">
               <a:rPr lang="en-SG" smtClean="0"/>
-              <a:t>12/2/2022</a:t>
+              <a:t>13/2/2022</a:t>
             </a:fld>
             <a:endParaRPr lang="en-SG"/>
           </a:p>
@@ -1156,7 +1156,7 @@
           <a:p>
             <a:fld id="{EB064AC1-ABF6-46DA-A589-1EFE59F3B602}" type="datetimeFigureOut">
               <a:rPr lang="en-SG" smtClean="0"/>
-              <a:t>12/2/2022</a:t>
+              <a:t>13/2/2022</a:t>
             </a:fld>
             <a:endParaRPr lang="en-SG"/>
           </a:p>
@@ -1424,7 +1424,7 @@
           <a:p>
             <a:fld id="{EB064AC1-ABF6-46DA-A589-1EFE59F3B602}" type="datetimeFigureOut">
               <a:rPr lang="en-SG" smtClean="0"/>
-              <a:t>12/2/2022</a:t>
+              <a:t>13/2/2022</a:t>
             </a:fld>
             <a:endParaRPr lang="en-SG"/>
           </a:p>
@@ -1839,7 +1839,7 @@
           <a:p>
             <a:fld id="{EB064AC1-ABF6-46DA-A589-1EFE59F3B602}" type="datetimeFigureOut">
               <a:rPr lang="en-SG" smtClean="0"/>
-              <a:t>12/2/2022</a:t>
+              <a:t>13/2/2022</a:t>
             </a:fld>
             <a:endParaRPr lang="en-SG"/>
           </a:p>
@@ -1981,7 +1981,7 @@
           <a:p>
             <a:fld id="{EB064AC1-ABF6-46DA-A589-1EFE59F3B602}" type="datetimeFigureOut">
               <a:rPr lang="en-SG" smtClean="0"/>
-              <a:t>12/2/2022</a:t>
+              <a:t>13/2/2022</a:t>
             </a:fld>
             <a:endParaRPr lang="en-SG"/>
           </a:p>
@@ -2094,7 +2094,7 @@
           <a:p>
             <a:fld id="{EB064AC1-ABF6-46DA-A589-1EFE59F3B602}" type="datetimeFigureOut">
               <a:rPr lang="en-SG" smtClean="0"/>
-              <a:t>12/2/2022</a:t>
+              <a:t>13/2/2022</a:t>
             </a:fld>
             <a:endParaRPr lang="en-SG"/>
           </a:p>
@@ -2407,7 +2407,7 @@
           <a:p>
             <a:fld id="{EB064AC1-ABF6-46DA-A589-1EFE59F3B602}" type="datetimeFigureOut">
               <a:rPr lang="en-SG" smtClean="0"/>
-              <a:t>12/2/2022</a:t>
+              <a:t>13/2/2022</a:t>
             </a:fld>
             <a:endParaRPr lang="en-SG"/>
           </a:p>
@@ -2696,7 +2696,7 @@
           <a:p>
             <a:fld id="{EB064AC1-ABF6-46DA-A589-1EFE59F3B602}" type="datetimeFigureOut">
               <a:rPr lang="en-SG" smtClean="0"/>
-              <a:t>12/2/2022</a:t>
+              <a:t>13/2/2022</a:t>
             </a:fld>
             <a:endParaRPr lang="en-SG"/>
           </a:p>
@@ -2939,7 +2939,7 @@
           <a:p>
             <a:fld id="{EB064AC1-ABF6-46DA-A589-1EFE59F3B602}" type="datetimeFigureOut">
               <a:rPr lang="en-SG" smtClean="0"/>
-              <a:t>12/2/2022</a:t>
+              <a:t>13/2/2022</a:t>
             </a:fld>
             <a:endParaRPr lang="en-SG"/>
           </a:p>
@@ -3378,7 +3378,7 @@
         </p:blipFill>
         <p:spPr>
           <a:xfrm>
-            <a:off x="1076325" y="1251895"/>
+            <a:off x="1093579" y="1090157"/>
             <a:ext cx="9715500" cy="5000092"/>
           </a:xfrm>
           <a:prstGeom prst="rect">
@@ -3386,6 +3386,59 @@
           </a:prstGeom>
         </p:spPr>
       </p:pic>
+      <p:sp>
+        <p:nvSpPr>
+          <p:cNvPr id="5" name="Rectangle 4">
+            <a:extLst>
+              <a:ext uri="{FF2B5EF4-FFF2-40B4-BE49-F238E27FC236}">
+                <a16:creationId xmlns:a16="http://schemas.microsoft.com/office/drawing/2014/main" id="{9105D0C0-A999-4532-996E-09805C222B88}"/>
+              </a:ext>
+            </a:extLst>
+          </p:cNvPr>
+          <p:cNvSpPr/>
+          <p:nvPr/>
+        </p:nvSpPr>
+        <p:spPr>
+          <a:xfrm>
+            <a:off x="1110831" y="2829464"/>
+            <a:ext cx="398792" cy="3260785"/>
+          </a:xfrm>
+          <a:prstGeom prst="rect">
+            <a:avLst/>
+          </a:prstGeom>
+          <a:noFill/>
+          <a:ln w="38100">
+            <a:solidFill>
+              <a:srgbClr val="FF0000"/>
+            </a:solidFill>
+            <a:prstDash val="solid"/>
+          </a:ln>
+        </p:spPr>
+        <p:style>
+          <a:lnRef idx="2">
+            <a:schemeClr val="accent1">
+              <a:shade val="50000"/>
+            </a:schemeClr>
+          </a:lnRef>
+          <a:fillRef idx="1">
+            <a:schemeClr val="accent1"/>
+          </a:fillRef>
+          <a:effectRef idx="0">
+            <a:schemeClr val="accent1"/>
+          </a:effectRef>
+          <a:fontRef idx="minor">
+            <a:schemeClr val="lt1"/>
+          </a:fontRef>
+        </p:style>
+        <p:txBody>
+          <a:bodyPr rtlCol="0" anchor="ctr"/>
+          <a:lstStyle/>
+          <a:p>
+            <a:pPr algn="ctr"/>
+            <a:endParaRPr lang="en-SG"/>
+          </a:p>
+        </p:txBody>
+      </p:sp>
     </p:spTree>
     <p:extLst>
       <p:ext uri="{BB962C8B-B14F-4D97-AF65-F5344CB8AC3E}">
@@ -3637,10 +3690,10 @@
       </p:pic>
       <p:sp>
         <p:nvSpPr>
-          <p:cNvPr id="4" name="Rectangle 3">
-            <a:extLst>
-              <a:ext uri="{FF2B5EF4-FFF2-40B4-BE49-F238E27FC236}">
-                <a16:creationId xmlns:a16="http://schemas.microsoft.com/office/drawing/2014/main" id="{56E2E88B-9684-4C73-879A-0C0930E17A2C}"/>
+          <p:cNvPr id="5" name="Rectangle 4">
+            <a:extLst>
+              <a:ext uri="{FF2B5EF4-FFF2-40B4-BE49-F238E27FC236}">
+                <a16:creationId xmlns:a16="http://schemas.microsoft.com/office/drawing/2014/main" id="{CD9CBED2-CBE7-49FF-952B-3C64F38E9C72}"/>
               </a:ext>
             </a:extLst>
           </p:cNvPr>
@@ -3649,8 +3702,8 @@
         </p:nvSpPr>
         <p:spPr>
           <a:xfrm>
-            <a:off x="3491878" y="2540898"/>
-            <a:ext cx="1015386" cy="461247"/>
+            <a:off x="1217603" y="3200589"/>
+            <a:ext cx="1226191" cy="551902"/>
           </a:xfrm>
           <a:prstGeom prst="rect">
             <a:avLst/>
@@ -3660,60 +3713,7 @@
             <a:solidFill>
               <a:srgbClr val="FF0000"/>
             </a:solidFill>
-            <a:prstDash val="dash"/>
-          </a:ln>
-        </p:spPr>
-        <p:style>
-          <a:lnRef idx="2">
-            <a:schemeClr val="accent1">
-              <a:shade val="50000"/>
-            </a:schemeClr>
-          </a:lnRef>
-          <a:fillRef idx="1">
-            <a:schemeClr val="accent1"/>
-          </a:fillRef>
-          <a:effectRef idx="0">
-            <a:schemeClr val="accent1"/>
-          </a:effectRef>
-          <a:fontRef idx="minor">
-            <a:schemeClr val="lt1"/>
-          </a:fontRef>
-        </p:style>
-        <p:txBody>
-          <a:bodyPr rtlCol="0" anchor="ctr"/>
-          <a:lstStyle/>
-          <a:p>
-            <a:pPr algn="ctr"/>
-            <a:endParaRPr lang="en-SG"/>
-          </a:p>
-        </p:txBody>
-      </p:sp>
-      <p:sp>
-        <p:nvSpPr>
-          <p:cNvPr id="5" name="Rectangle 4">
-            <a:extLst>
-              <a:ext uri="{FF2B5EF4-FFF2-40B4-BE49-F238E27FC236}">
-                <a16:creationId xmlns:a16="http://schemas.microsoft.com/office/drawing/2014/main" id="{CD9CBED2-CBE7-49FF-952B-3C64F38E9C72}"/>
-              </a:ext>
-            </a:extLst>
-          </p:cNvPr>
-          <p:cNvSpPr/>
-          <p:nvPr/>
-        </p:nvSpPr>
-        <p:spPr>
-          <a:xfrm>
-            <a:off x="1217603" y="3198376"/>
-            <a:ext cx="1226191" cy="556328"/>
-          </a:xfrm>
-          <a:prstGeom prst="rect">
-            <a:avLst/>
-          </a:prstGeom>
-          <a:noFill/>
-          <a:ln w="38100">
-            <a:solidFill>
-              <a:srgbClr val="FF0000"/>
-            </a:solidFill>
-            <a:prstDash val="dash"/>
+            <a:prstDash val="solid"/>
           </a:ln>
         </p:spPr>
         <p:style>
@@ -3838,10 +3838,45 @@
       </p:pic>
       <p:sp>
         <p:nvSpPr>
-          <p:cNvPr id="4" name="Rectangle 3">
-            <a:extLst>
-              <a:ext uri="{FF2B5EF4-FFF2-40B4-BE49-F238E27FC236}">
-                <a16:creationId xmlns:a16="http://schemas.microsoft.com/office/drawing/2014/main" id="{5AE67AA8-B6BB-4B2A-8A78-49B6774C99E0}"/>
+          <p:cNvPr id="6" name="TextBox 5">
+            <a:extLst>
+              <a:ext uri="{FF2B5EF4-FFF2-40B4-BE49-F238E27FC236}">
+                <a16:creationId xmlns:a16="http://schemas.microsoft.com/office/drawing/2014/main" id="{3E06C315-1935-44D0-BB4E-060BFF164712}"/>
+              </a:ext>
+            </a:extLst>
+          </p:cNvPr>
+          <p:cNvSpPr txBox="1"/>
+          <p:nvPr/>
+        </p:nvSpPr>
+        <p:spPr>
+          <a:xfrm>
+            <a:off x="1222310" y="727788"/>
+            <a:ext cx="10151706" cy="369332"/>
+          </a:xfrm>
+          <a:prstGeom prst="rect">
+            <a:avLst/>
+          </a:prstGeom>
+          <a:noFill/>
+        </p:spPr>
+        <p:txBody>
+          <a:bodyPr wrap="square" rtlCol="0">
+            <a:spAutoFit/>
+          </a:bodyPr>
+          <a:lstStyle/>
+          <a:p>
+            <a:r>
+              <a:rPr lang="en-SG" dirty="0"/>
+              <a:t>3. Click on the “+” sign and “Pivot” . This will enable us to pivot the years to a column</a:t>
+            </a:r>
+          </a:p>
+        </p:txBody>
+      </p:sp>
+      <p:sp>
+        <p:nvSpPr>
+          <p:cNvPr id="7" name="Rectangle 6">
+            <a:extLst>
+              <a:ext uri="{FF2B5EF4-FFF2-40B4-BE49-F238E27FC236}">
+                <a16:creationId xmlns:a16="http://schemas.microsoft.com/office/drawing/2014/main" id="{1BA2FFE3-676F-49EF-92C3-BAD18FFE6C0F}"/>
               </a:ext>
             </a:extLst>
           </p:cNvPr>
@@ -3850,8 +3885,8 @@
         </p:nvSpPr>
         <p:spPr>
           <a:xfrm>
-            <a:off x="3930416" y="2509934"/>
-            <a:ext cx="473632" cy="184300"/>
+            <a:off x="4209690" y="3200585"/>
+            <a:ext cx="698739" cy="185279"/>
           </a:xfrm>
           <a:prstGeom prst="rect">
             <a:avLst/>
@@ -3861,7 +3896,7 @@
             <a:solidFill>
               <a:srgbClr val="FF0000"/>
             </a:solidFill>
-            <a:prstDash val="dash"/>
+            <a:prstDash val="solid"/>
           </a:ln>
         </p:spPr>
         <p:style>
@@ -3891,10 +3926,10 @@
       </p:sp>
       <p:sp>
         <p:nvSpPr>
-          <p:cNvPr id="5" name="Rectangle 4">
-            <a:extLst>
-              <a:ext uri="{FF2B5EF4-FFF2-40B4-BE49-F238E27FC236}">
-                <a16:creationId xmlns:a16="http://schemas.microsoft.com/office/drawing/2014/main" id="{6ED121E7-C222-4308-9EC3-0D48925D8CEC}"/>
+          <p:cNvPr id="8" name="Rectangle 7">
+            <a:extLst>
+              <a:ext uri="{FF2B5EF4-FFF2-40B4-BE49-F238E27FC236}">
+                <a16:creationId xmlns:a16="http://schemas.microsoft.com/office/drawing/2014/main" id="{A743BC4F-64F0-4E5A-8CE4-8184871C96D4}"/>
               </a:ext>
             </a:extLst>
           </p:cNvPr>
@@ -3903,8 +3938,8 @@
         </p:nvSpPr>
         <p:spPr>
           <a:xfrm>
-            <a:off x="4129471" y="3198045"/>
-            <a:ext cx="741112" cy="184300"/>
+            <a:off x="4090199" y="2533511"/>
+            <a:ext cx="205755" cy="185279"/>
           </a:xfrm>
           <a:prstGeom prst="rect">
             <a:avLst/>
@@ -3914,7 +3949,7 @@
             <a:solidFill>
               <a:srgbClr val="FF0000"/>
             </a:solidFill>
-            <a:prstDash val="dash"/>
+            <a:prstDash val="solid"/>
           </a:ln>
         </p:spPr>
         <p:style>
@@ -3939,41 +3974,6 @@
           <a:p>
             <a:pPr algn="ctr"/>
             <a:endParaRPr lang="en-SG"/>
-          </a:p>
-        </p:txBody>
-      </p:sp>
-      <p:sp>
-        <p:nvSpPr>
-          <p:cNvPr id="6" name="TextBox 5">
-            <a:extLst>
-              <a:ext uri="{FF2B5EF4-FFF2-40B4-BE49-F238E27FC236}">
-                <a16:creationId xmlns:a16="http://schemas.microsoft.com/office/drawing/2014/main" id="{3E06C315-1935-44D0-BB4E-060BFF164712}"/>
-              </a:ext>
-            </a:extLst>
-          </p:cNvPr>
-          <p:cNvSpPr txBox="1"/>
-          <p:nvPr/>
-        </p:nvSpPr>
-        <p:spPr>
-          <a:xfrm>
-            <a:off x="1222310" y="727788"/>
-            <a:ext cx="10151706" cy="369332"/>
-          </a:xfrm>
-          <a:prstGeom prst="rect">
-            <a:avLst/>
-          </a:prstGeom>
-          <a:noFill/>
-        </p:spPr>
-        <p:txBody>
-          <a:bodyPr wrap="square" rtlCol="0">
-            <a:spAutoFit/>
-          </a:bodyPr>
-          <a:lstStyle/>
-          <a:p>
-            <a:r>
-              <a:rPr lang="en-SG" dirty="0"/>
-              <a:t>3. Click on the “+” sign and “Pivot” . This will enable us to pivot the years to a column</a:t>
-            </a:r>
           </a:p>
         </p:txBody>
       </p:sp>
@@ -4465,41 +4465,6 @@
         <p:spPr>
           <a:xfrm>
             <a:off x="807396" y="491646"/>
-            <a:ext cx="9465013" cy="1200329"/>
-          </a:xfrm>
-          <a:prstGeom prst="rect">
-            <a:avLst/>
-          </a:prstGeom>
-          <a:noFill/>
-        </p:spPr>
-        <p:txBody>
-          <a:bodyPr wrap="square" rtlCol="0">
-            <a:spAutoFit/>
-          </a:bodyPr>
-          <a:lstStyle/>
-          <a:p>
-            <a:r>
-              <a:rPr lang="en-SG" dirty="0"/>
-              <a:t>Add a step and click on the “+” sign to add a pivot. Drag the Category to “Pivoted field” and LFPR to “Field to aggregate for new columns”. This will pivot the Male, Female and Total from rows to column title. This step is needed for us to draw LFPR for Total, Males and Female in the same chart in Tableau.</a:t>
-            </a:r>
-          </a:p>
-        </p:txBody>
-      </p:sp>
-      <p:sp>
-        <p:nvSpPr>
-          <p:cNvPr id="5" name="TextBox 4">
-            <a:extLst>
-              <a:ext uri="{FF2B5EF4-FFF2-40B4-BE49-F238E27FC236}">
-                <a16:creationId xmlns:a16="http://schemas.microsoft.com/office/drawing/2014/main" id="{14AD17E9-0689-42A6-AF7D-0189F4172C6C}"/>
-              </a:ext>
-            </a:extLst>
-          </p:cNvPr>
-          <p:cNvSpPr txBox="1"/>
-          <p:nvPr/>
-        </p:nvSpPr>
-        <p:spPr>
-          <a:xfrm>
-            <a:off x="959796" y="644046"/>
             <a:ext cx="9465013" cy="1200329"/>
           </a:xfrm>
           <a:prstGeom prst="rect">

</xml_diff>